<commit_message>
doc: added notes pptx
</commit_message>
<xml_diff>
--- a/notes.pptx
+++ b/notes.pptx
@@ -19,6 +19,7 @@
     <p:sldId id="267" r:id="rId13"/>
     <p:sldId id="268" r:id="rId14"/>
     <p:sldId id="269" r:id="rId15"/>
+    <p:sldId id="270" r:id="rId16"/>
   </p:sldIdLst>
   <p:sldSz cx="12192000" cy="6858000"/>
   <p:notesSz cx="6858000" cy="9144000"/>
@@ -274,7 +275,7 @@
           <a:p>
             <a:fld id="{1E9D4DA6-1F4D-4072-9235-55282EDBB405}" type="datetimeFigureOut">
               <a:rPr lang="fr-FR" smtClean="0"/>
-              <a:t>28/06/2022</a:t>
+              <a:t>30/06/2022</a:t>
             </a:fld>
             <a:endParaRPr lang="fr-FR"/>
           </a:p>
@@ -474,7 +475,7 @@
           <a:p>
             <a:fld id="{1E9D4DA6-1F4D-4072-9235-55282EDBB405}" type="datetimeFigureOut">
               <a:rPr lang="fr-FR" smtClean="0"/>
-              <a:t>28/06/2022</a:t>
+              <a:t>30/06/2022</a:t>
             </a:fld>
             <a:endParaRPr lang="fr-FR"/>
           </a:p>
@@ -684,7 +685,7 @@
           <a:p>
             <a:fld id="{1E9D4DA6-1F4D-4072-9235-55282EDBB405}" type="datetimeFigureOut">
               <a:rPr lang="fr-FR" smtClean="0"/>
-              <a:t>28/06/2022</a:t>
+              <a:t>30/06/2022</a:t>
             </a:fld>
             <a:endParaRPr lang="fr-FR"/>
           </a:p>
@@ -884,7 +885,7 @@
           <a:p>
             <a:fld id="{1E9D4DA6-1F4D-4072-9235-55282EDBB405}" type="datetimeFigureOut">
               <a:rPr lang="fr-FR" smtClean="0"/>
-              <a:t>28/06/2022</a:t>
+              <a:t>30/06/2022</a:t>
             </a:fld>
             <a:endParaRPr lang="fr-FR"/>
           </a:p>
@@ -1160,7 +1161,7 @@
           <a:p>
             <a:fld id="{1E9D4DA6-1F4D-4072-9235-55282EDBB405}" type="datetimeFigureOut">
               <a:rPr lang="fr-FR" smtClean="0"/>
-              <a:t>28/06/2022</a:t>
+              <a:t>30/06/2022</a:t>
             </a:fld>
             <a:endParaRPr lang="fr-FR"/>
           </a:p>
@@ -1428,7 +1429,7 @@
           <a:p>
             <a:fld id="{1E9D4DA6-1F4D-4072-9235-55282EDBB405}" type="datetimeFigureOut">
               <a:rPr lang="fr-FR" smtClean="0"/>
-              <a:t>28/06/2022</a:t>
+              <a:t>30/06/2022</a:t>
             </a:fld>
             <a:endParaRPr lang="fr-FR"/>
           </a:p>
@@ -1843,7 +1844,7 @@
           <a:p>
             <a:fld id="{1E9D4DA6-1F4D-4072-9235-55282EDBB405}" type="datetimeFigureOut">
               <a:rPr lang="fr-FR" smtClean="0"/>
-              <a:t>28/06/2022</a:t>
+              <a:t>30/06/2022</a:t>
             </a:fld>
             <a:endParaRPr lang="fr-FR"/>
           </a:p>
@@ -1985,7 +1986,7 @@
           <a:p>
             <a:fld id="{1E9D4DA6-1F4D-4072-9235-55282EDBB405}" type="datetimeFigureOut">
               <a:rPr lang="fr-FR" smtClean="0"/>
-              <a:t>28/06/2022</a:t>
+              <a:t>30/06/2022</a:t>
             </a:fld>
             <a:endParaRPr lang="fr-FR"/>
           </a:p>
@@ -2098,7 +2099,7 @@
           <a:p>
             <a:fld id="{1E9D4DA6-1F4D-4072-9235-55282EDBB405}" type="datetimeFigureOut">
               <a:rPr lang="fr-FR" smtClean="0"/>
-              <a:t>28/06/2022</a:t>
+              <a:t>30/06/2022</a:t>
             </a:fld>
             <a:endParaRPr lang="fr-FR"/>
           </a:p>
@@ -2411,7 +2412,7 @@
           <a:p>
             <a:fld id="{1E9D4DA6-1F4D-4072-9235-55282EDBB405}" type="datetimeFigureOut">
               <a:rPr lang="fr-FR" smtClean="0"/>
-              <a:t>28/06/2022</a:t>
+              <a:t>30/06/2022</a:t>
             </a:fld>
             <a:endParaRPr lang="fr-FR"/>
           </a:p>
@@ -2700,7 +2701,7 @@
           <a:p>
             <a:fld id="{1E9D4DA6-1F4D-4072-9235-55282EDBB405}" type="datetimeFigureOut">
               <a:rPr lang="fr-FR" smtClean="0"/>
-              <a:t>28/06/2022</a:t>
+              <a:t>30/06/2022</a:t>
             </a:fld>
             <a:endParaRPr lang="fr-FR"/>
           </a:p>
@@ -2943,7 +2944,7 @@
           <a:p>
             <a:fld id="{1E9D4DA6-1F4D-4072-9235-55282EDBB405}" type="datetimeFigureOut">
               <a:rPr lang="fr-FR" smtClean="0"/>
-              <a:t>28/06/2022</a:t>
+              <a:t>30/06/2022</a:t>
             </a:fld>
             <a:endParaRPr lang="fr-FR"/>
           </a:p>
@@ -3840,6 +3841,48 @@
             <a:endParaRPr lang="fr-FR" dirty="0"/>
           </a:p>
           <a:p>
+            <a:r>
+              <a:rPr lang="fr-FR" dirty="0">
+                <a:hlinkClick r:id="rId3"/>
+              </a:rPr>
+              <a:t>https://caniuse.com/</a:t>
+            </a:r>
+            <a:endParaRPr lang="fr-FR" dirty="0"/>
+          </a:p>
+          <a:p>
+            <a:r>
+              <a:rPr lang="fr-FR" dirty="0">
+                <a:hlinkClick r:id="rId4"/>
+              </a:rPr>
+              <a:t>https://github.com/tc39/proposals/blob/main/finished-proposals.md</a:t>
+            </a:r>
+            <a:endParaRPr lang="fr-FR" dirty="0"/>
+          </a:p>
+          <a:p>
+            <a:r>
+              <a:rPr lang="fr-FR" dirty="0">
+                <a:hlinkClick r:id="rId5"/>
+              </a:rPr>
+              <a:t>https://github.com/jlg-formation/fuj-juillet-2020</a:t>
+            </a:r>
+            <a:endParaRPr lang="fr-FR" dirty="0"/>
+          </a:p>
+          <a:p>
+            <a:r>
+              <a:rPr lang="fr-FR" dirty="0">
+                <a:hlinkClick r:id="rId6"/>
+              </a:rPr>
+              <a:t>https://bestofjs.org/</a:t>
+            </a:r>
+            <a:endParaRPr lang="fr-FR" dirty="0"/>
+          </a:p>
+          <a:p>
+            <a:endParaRPr lang="fr-FR" dirty="0"/>
+          </a:p>
+          <a:p>
+            <a:endParaRPr lang="fr-FR" dirty="0"/>
+          </a:p>
+          <a:p>
             <a:endParaRPr lang="fr-FR" dirty="0"/>
           </a:p>
         </p:txBody>
@@ -5011,6 +5054,481 @@
 </p:sld>
 </file>
 
+<file path=ppt/slides/slide15.xml><?xml version="1.0" encoding="utf-8"?>
+<p:sld xmlns:a="http://schemas.openxmlformats.org/drawingml/2006/main" xmlns:r="http://schemas.openxmlformats.org/officeDocument/2006/relationships" xmlns:p="http://schemas.openxmlformats.org/presentationml/2006/main">
+  <p:cSld>
+    <p:spTree>
+      <p:nvGrpSpPr>
+        <p:cNvPr id="1" name=""/>
+        <p:cNvGrpSpPr/>
+        <p:nvPr/>
+      </p:nvGrpSpPr>
+      <p:grpSpPr>
+        <a:xfrm>
+          <a:off x="0" y="0"/>
+          <a:ext cx="0" cy="0"/>
+          <a:chOff x="0" y="0"/>
+          <a:chExt cx="0" cy="0"/>
+        </a:xfrm>
+      </p:grpSpPr>
+      <p:sp>
+        <p:nvSpPr>
+          <p:cNvPr id="2" name="Title 1">
+            <a:extLst>
+              <a:ext uri="{FF2B5EF4-FFF2-40B4-BE49-F238E27FC236}">
+                <a16:creationId xmlns:a16="http://schemas.microsoft.com/office/drawing/2014/main" id="{725CDDFE-7D72-4240-9A9A-BD1D73CFEBEC}"/>
+              </a:ext>
+            </a:extLst>
+          </p:cNvPr>
+          <p:cNvSpPr>
+            <a:spLocks noGrp="1"/>
+          </p:cNvSpPr>
+          <p:nvPr>
+            <p:ph type="title"/>
+          </p:nvPr>
+        </p:nvSpPr>
+        <p:spPr/>
+        <p:txBody>
+          <a:bodyPr/>
+          <a:lstStyle/>
+          <a:p>
+            <a:r>
+              <a:rPr lang="fr-FR" dirty="0"/>
+              <a:t>CORS</a:t>
+            </a:r>
+          </a:p>
+        </p:txBody>
+      </p:sp>
+      <p:sp>
+        <p:nvSpPr>
+          <p:cNvPr id="4" name="Rectangle 3">
+            <a:extLst>
+              <a:ext uri="{FF2B5EF4-FFF2-40B4-BE49-F238E27FC236}">
+                <a16:creationId xmlns:a16="http://schemas.microsoft.com/office/drawing/2014/main" id="{F89B9CFF-FA45-4873-A1DC-C6B91313396B}"/>
+              </a:ext>
+            </a:extLst>
+          </p:cNvPr>
+          <p:cNvSpPr/>
+          <p:nvPr/>
+        </p:nvSpPr>
+        <p:spPr>
+          <a:xfrm>
+            <a:off x="611132" y="2752390"/>
+            <a:ext cx="1442822" cy="1254428"/>
+          </a:xfrm>
+          <a:prstGeom prst="rect">
+            <a:avLst/>
+          </a:prstGeom>
+        </p:spPr>
+        <p:style>
+          <a:lnRef idx="2">
+            <a:schemeClr val="accent1">
+              <a:shade val="50000"/>
+            </a:schemeClr>
+          </a:lnRef>
+          <a:fillRef idx="1">
+            <a:schemeClr val="accent1"/>
+          </a:fillRef>
+          <a:effectRef idx="0">
+            <a:schemeClr val="accent1"/>
+          </a:effectRef>
+          <a:fontRef idx="minor">
+            <a:schemeClr val="lt1"/>
+          </a:fontRef>
+        </p:style>
+        <p:txBody>
+          <a:bodyPr rtlCol="0" anchor="ctr"/>
+          <a:lstStyle/>
+          <a:p>
+            <a:pPr algn="ctr"/>
+            <a:r>
+              <a:rPr lang="fr-FR" dirty="0"/>
+              <a:t>Client</a:t>
+            </a:r>
+          </a:p>
+        </p:txBody>
+      </p:sp>
+      <p:sp>
+        <p:nvSpPr>
+          <p:cNvPr id="5" name="Rectangle 4">
+            <a:extLst>
+              <a:ext uri="{FF2B5EF4-FFF2-40B4-BE49-F238E27FC236}">
+                <a16:creationId xmlns:a16="http://schemas.microsoft.com/office/drawing/2014/main" id="{B1EE8334-FC4A-497B-B86D-1F4A9733A771}"/>
+              </a:ext>
+            </a:extLst>
+          </p:cNvPr>
+          <p:cNvSpPr/>
+          <p:nvPr/>
+        </p:nvSpPr>
+        <p:spPr>
+          <a:xfrm>
+            <a:off x="6736999" y="967111"/>
+            <a:ext cx="1442822" cy="1254428"/>
+          </a:xfrm>
+          <a:prstGeom prst="rect">
+            <a:avLst/>
+          </a:prstGeom>
+        </p:spPr>
+        <p:style>
+          <a:lnRef idx="2">
+            <a:schemeClr val="accent1">
+              <a:shade val="50000"/>
+            </a:schemeClr>
+          </a:lnRef>
+          <a:fillRef idx="1">
+            <a:schemeClr val="accent1"/>
+          </a:fillRef>
+          <a:effectRef idx="0">
+            <a:schemeClr val="accent1"/>
+          </a:effectRef>
+          <a:fontRef idx="minor">
+            <a:schemeClr val="lt1"/>
+          </a:fontRef>
+        </p:style>
+        <p:txBody>
+          <a:bodyPr rtlCol="0" anchor="ctr"/>
+          <a:lstStyle/>
+          <a:p>
+            <a:pPr algn="ctr"/>
+            <a:r>
+              <a:rPr lang="fr-FR" dirty="0"/>
+              <a:t>Origin</a:t>
+            </a:r>
+          </a:p>
+          <a:p>
+            <a:pPr algn="ctr"/>
+            <a:r>
+              <a:rPr lang="fr-FR" dirty="0"/>
+              <a:t>Server</a:t>
+            </a:r>
+          </a:p>
+        </p:txBody>
+      </p:sp>
+      <p:sp>
+        <p:nvSpPr>
+          <p:cNvPr id="6" name="TextBox 5">
+            <a:extLst>
+              <a:ext uri="{FF2B5EF4-FFF2-40B4-BE49-F238E27FC236}">
+                <a16:creationId xmlns:a16="http://schemas.microsoft.com/office/drawing/2014/main" id="{CE74DE47-898A-49BF-9B46-4E9E0F13E2F9}"/>
+              </a:ext>
+            </a:extLst>
+          </p:cNvPr>
+          <p:cNvSpPr txBox="1"/>
+          <p:nvPr/>
+        </p:nvSpPr>
+        <p:spPr>
+          <a:xfrm>
+            <a:off x="6602979" y="487067"/>
+            <a:ext cx="1655325" cy="369332"/>
+          </a:xfrm>
+          <a:prstGeom prst="rect">
+            <a:avLst/>
+          </a:prstGeom>
+          <a:noFill/>
+        </p:spPr>
+        <p:txBody>
+          <a:bodyPr wrap="none" rtlCol="0">
+            <a:spAutoFit/>
+          </a:bodyPr>
+          <a:lstStyle/>
+          <a:p>
+            <a:r>
+              <a:rPr lang="fr-FR" dirty="0"/>
+              <a:t>http://truc.com</a:t>
+            </a:r>
+          </a:p>
+        </p:txBody>
+      </p:sp>
+      <p:cxnSp>
+        <p:nvCxnSpPr>
+          <p:cNvPr id="8" name="Straight Arrow Connector 7">
+            <a:extLst>
+              <a:ext uri="{FF2B5EF4-FFF2-40B4-BE49-F238E27FC236}">
+                <a16:creationId xmlns:a16="http://schemas.microsoft.com/office/drawing/2014/main" id="{5DD6236D-1B0C-44AB-A695-8F40FF4ACF0F}"/>
+              </a:ext>
+            </a:extLst>
+          </p:cNvPr>
+          <p:cNvCxnSpPr>
+            <a:endCxn id="5" idx="1"/>
+          </p:cNvCxnSpPr>
+          <p:nvPr/>
+        </p:nvCxnSpPr>
+        <p:spPr>
+          <a:xfrm flipV="1">
+            <a:off x="2053954" y="1594325"/>
+            <a:ext cx="4683045" cy="1383219"/>
+          </a:xfrm>
+          <a:prstGeom prst="straightConnector1">
+            <a:avLst/>
+          </a:prstGeom>
+          <a:ln w="76200">
+            <a:solidFill>
+              <a:schemeClr val="accent1"/>
+            </a:solidFill>
+            <a:tailEnd type="triangle"/>
+          </a:ln>
+        </p:spPr>
+        <p:style>
+          <a:lnRef idx="1">
+            <a:schemeClr val="accent1"/>
+          </a:lnRef>
+          <a:fillRef idx="0">
+            <a:schemeClr val="accent1"/>
+          </a:fillRef>
+          <a:effectRef idx="0">
+            <a:schemeClr val="accent1"/>
+          </a:effectRef>
+          <a:fontRef idx="minor">
+            <a:schemeClr val="tx1"/>
+          </a:fontRef>
+        </p:style>
+      </p:cxnSp>
+      <p:cxnSp>
+        <p:nvCxnSpPr>
+          <p:cNvPr id="10" name="Straight Arrow Connector 9">
+            <a:extLst>
+              <a:ext uri="{FF2B5EF4-FFF2-40B4-BE49-F238E27FC236}">
+                <a16:creationId xmlns:a16="http://schemas.microsoft.com/office/drawing/2014/main" id="{B164CA2B-B1CF-44CB-AB62-4B15E1C38735}"/>
+              </a:ext>
+            </a:extLst>
+          </p:cNvPr>
+          <p:cNvCxnSpPr>
+            <a:endCxn id="4" idx="3"/>
+          </p:cNvCxnSpPr>
+          <p:nvPr/>
+        </p:nvCxnSpPr>
+        <p:spPr>
+          <a:xfrm flipH="1">
+            <a:off x="2053954" y="1985029"/>
+            <a:ext cx="4683045" cy="1394575"/>
+          </a:xfrm>
+          <a:prstGeom prst="straightConnector1">
+            <a:avLst/>
+          </a:prstGeom>
+          <a:ln w="76200">
+            <a:solidFill>
+              <a:schemeClr val="accent1"/>
+            </a:solidFill>
+            <a:tailEnd type="triangle"/>
+          </a:ln>
+        </p:spPr>
+        <p:style>
+          <a:lnRef idx="1">
+            <a:schemeClr val="accent1"/>
+          </a:lnRef>
+          <a:fillRef idx="0">
+            <a:schemeClr val="accent1"/>
+          </a:fillRef>
+          <a:effectRef idx="0">
+            <a:schemeClr val="accent1"/>
+          </a:effectRef>
+          <a:fontRef idx="minor">
+            <a:schemeClr val="tx1"/>
+          </a:fontRef>
+        </p:style>
+      </p:cxnSp>
+      <p:sp>
+        <p:nvSpPr>
+          <p:cNvPr id="11" name="Rectangle 10">
+            <a:extLst>
+              <a:ext uri="{FF2B5EF4-FFF2-40B4-BE49-F238E27FC236}">
+                <a16:creationId xmlns:a16="http://schemas.microsoft.com/office/drawing/2014/main" id="{BDD37CE0-261A-4913-891C-B9227D4EBCF2}"/>
+              </a:ext>
+            </a:extLst>
+          </p:cNvPr>
+          <p:cNvSpPr/>
+          <p:nvPr/>
+        </p:nvSpPr>
+        <p:spPr>
+          <a:xfrm>
+            <a:off x="6671904" y="4080206"/>
+            <a:ext cx="1442822" cy="1254428"/>
+          </a:xfrm>
+          <a:prstGeom prst="rect">
+            <a:avLst/>
+          </a:prstGeom>
+        </p:spPr>
+        <p:style>
+          <a:lnRef idx="2">
+            <a:schemeClr val="accent1">
+              <a:shade val="50000"/>
+            </a:schemeClr>
+          </a:lnRef>
+          <a:fillRef idx="1">
+            <a:schemeClr val="accent1"/>
+          </a:fillRef>
+          <a:effectRef idx="0">
+            <a:schemeClr val="accent1"/>
+          </a:effectRef>
+          <a:fontRef idx="minor">
+            <a:schemeClr val="lt1"/>
+          </a:fontRef>
+        </p:style>
+        <p:txBody>
+          <a:bodyPr rtlCol="0" anchor="ctr"/>
+          <a:lstStyle/>
+          <a:p>
+            <a:pPr algn="ctr"/>
+            <a:r>
+              <a:rPr lang="fr-FR" dirty="0"/>
+              <a:t>Target</a:t>
+            </a:r>
+          </a:p>
+          <a:p>
+            <a:pPr algn="ctr"/>
+            <a:r>
+              <a:rPr lang="fr-FR" dirty="0"/>
+              <a:t>Server</a:t>
+            </a:r>
+          </a:p>
+        </p:txBody>
+      </p:sp>
+      <p:cxnSp>
+        <p:nvCxnSpPr>
+          <p:cNvPr id="13" name="Straight Arrow Connector 12">
+            <a:extLst>
+              <a:ext uri="{FF2B5EF4-FFF2-40B4-BE49-F238E27FC236}">
+                <a16:creationId xmlns:a16="http://schemas.microsoft.com/office/drawing/2014/main" id="{2D4FAB27-A91B-481D-987F-303C3A5142F1}"/>
+              </a:ext>
+            </a:extLst>
+          </p:cNvPr>
+          <p:cNvCxnSpPr/>
+          <p:nvPr/>
+        </p:nvCxnSpPr>
+        <p:spPr>
+          <a:xfrm>
+            <a:off x="2053954" y="3630030"/>
+            <a:ext cx="4617950" cy="900615"/>
+          </a:xfrm>
+          <a:prstGeom prst="straightConnector1">
+            <a:avLst/>
+          </a:prstGeom>
+          <a:ln w="76200">
+            <a:solidFill>
+              <a:schemeClr val="accent1"/>
+            </a:solidFill>
+            <a:tailEnd type="triangle"/>
+          </a:ln>
+        </p:spPr>
+        <p:style>
+          <a:lnRef idx="1">
+            <a:schemeClr val="accent1"/>
+          </a:lnRef>
+          <a:fillRef idx="0">
+            <a:schemeClr val="accent1"/>
+          </a:fillRef>
+          <a:effectRef idx="0">
+            <a:schemeClr val="accent1"/>
+          </a:effectRef>
+          <a:fontRef idx="minor">
+            <a:schemeClr val="tx1"/>
+          </a:fontRef>
+        </p:style>
+      </p:cxnSp>
+      <p:cxnSp>
+        <p:nvCxnSpPr>
+          <p:cNvPr id="15" name="Straight Arrow Connector 14">
+            <a:extLst>
+              <a:ext uri="{FF2B5EF4-FFF2-40B4-BE49-F238E27FC236}">
+                <a16:creationId xmlns:a16="http://schemas.microsoft.com/office/drawing/2014/main" id="{ACB91C44-945F-415D-81C9-E118E8E8A320}"/>
+              </a:ext>
+            </a:extLst>
+          </p:cNvPr>
+          <p:cNvCxnSpPr/>
+          <p:nvPr/>
+        </p:nvCxnSpPr>
+        <p:spPr>
+          <a:xfrm flipH="1" flipV="1">
+            <a:off x="2053954" y="3896539"/>
+            <a:ext cx="4617950" cy="1043059"/>
+          </a:xfrm>
+          <a:prstGeom prst="straightConnector1">
+            <a:avLst/>
+          </a:prstGeom>
+          <a:ln w="76200">
+            <a:solidFill>
+              <a:schemeClr val="accent1"/>
+            </a:solidFill>
+            <a:tailEnd type="triangle"/>
+          </a:ln>
+        </p:spPr>
+        <p:style>
+          <a:lnRef idx="1">
+            <a:schemeClr val="accent1"/>
+          </a:lnRef>
+          <a:fillRef idx="0">
+            <a:schemeClr val="accent1"/>
+          </a:fillRef>
+          <a:effectRef idx="0">
+            <a:schemeClr val="accent1"/>
+          </a:effectRef>
+          <a:fontRef idx="minor">
+            <a:schemeClr val="tx1"/>
+          </a:fontRef>
+        </p:style>
+      </p:cxnSp>
+      <p:sp>
+        <p:nvSpPr>
+          <p:cNvPr id="16" name="Rectangle 15">
+            <a:extLst>
+              <a:ext uri="{FF2B5EF4-FFF2-40B4-BE49-F238E27FC236}">
+                <a16:creationId xmlns:a16="http://schemas.microsoft.com/office/drawing/2014/main" id="{00EBA7EF-9B54-405C-A1CE-AD623D6C0710}"/>
+              </a:ext>
+            </a:extLst>
+          </p:cNvPr>
+          <p:cNvSpPr/>
+          <p:nvPr/>
+        </p:nvSpPr>
+        <p:spPr>
+          <a:xfrm>
+            <a:off x="1677732" y="3818424"/>
+            <a:ext cx="868450" cy="657082"/>
+          </a:xfrm>
+          <a:prstGeom prst="rect">
+            <a:avLst/>
+          </a:prstGeom>
+        </p:spPr>
+        <p:style>
+          <a:lnRef idx="2">
+            <a:schemeClr val="accent2">
+              <a:shade val="50000"/>
+            </a:schemeClr>
+          </a:lnRef>
+          <a:fillRef idx="1">
+            <a:schemeClr val="accent2"/>
+          </a:fillRef>
+          <a:effectRef idx="0">
+            <a:schemeClr val="accent2"/>
+          </a:effectRef>
+          <a:fontRef idx="minor">
+            <a:schemeClr val="lt1"/>
+          </a:fontRef>
+        </p:style>
+        <p:txBody>
+          <a:bodyPr rtlCol="0" anchor="ctr"/>
+          <a:lstStyle/>
+          <a:p>
+            <a:pPr algn="ctr"/>
+            <a:r>
+              <a:rPr lang="fr-FR" dirty="0"/>
+              <a:t>CORS</a:t>
+            </a:r>
+          </a:p>
+        </p:txBody>
+      </p:sp>
+    </p:spTree>
+    <p:extLst>
+      <p:ext uri="{BB962C8B-B14F-4D97-AF65-F5344CB8AC3E}">
+        <p14:creationId xmlns:p14="http://schemas.microsoft.com/office/powerpoint/2010/main" val="4162514662"/>
+      </p:ext>
+    </p:extLst>
+  </p:cSld>
+  <p:clrMapOvr>
+    <a:masterClrMapping/>
+  </p:clrMapOvr>
+</p:sld>
+</file>
+
 <file path=ppt/slides/slide2.xml><?xml version="1.0" encoding="utf-8"?>
 <p:sld xmlns:a="http://schemas.openxmlformats.org/drawingml/2006/main" xmlns:r="http://schemas.openxmlformats.org/officeDocument/2006/relationships" xmlns:p="http://schemas.openxmlformats.org/presentationml/2006/main">
   <p:cSld>
@@ -5074,7 +5592,9 @@
         </p:nvSpPr>
         <p:spPr/>
         <p:txBody>
-          <a:bodyPr/>
+          <a:bodyPr>
+            <a:normAutofit lnSpcReduction="10000"/>
+          </a:bodyPr>
           <a:lstStyle/>
           <a:p>
             <a:r>
@@ -5146,6 +5666,20 @@
             <a:r>
               <a:rPr lang="fr-FR" dirty="0" err="1"/>
               <a:t>snippets</a:t>
+            </a:r>
+            <a:endParaRPr lang="fr-FR" dirty="0"/>
+          </a:p>
+          <a:p>
+            <a:r>
+              <a:rPr lang="fr-FR" dirty="0" err="1"/>
+              <a:t>ESLint</a:t>
+            </a:r>
+            <a:endParaRPr lang="fr-FR" dirty="0"/>
+          </a:p>
+          <a:p>
+            <a:r>
+              <a:rPr lang="fr-FR" dirty="0" err="1"/>
+              <a:t>SonarLint</a:t>
             </a:r>
             <a:endParaRPr lang="fr-FR" dirty="0"/>
           </a:p>

</xml_diff>